<commit_message>
Added final ppt and pdf.
</commit_message>
<xml_diff>
--- a/documents/Final Presentation.pptx
+++ b/documents/Final Presentation.pptx
@@ -8323,14 +8323,14 @@
             <p:ph idx="1"/>
             <p:extLst>
               <p:ext uri="{D42A27DB-BD31-4B8C-83A1-F6EECF244321}">
-                <p14:modId xmlns:p14="http://schemas.microsoft.com/office/powerpoint/2010/main" val="2525875962"/>
+                <p14:modId xmlns:p14="http://schemas.microsoft.com/office/powerpoint/2010/main" val="1921988810"/>
               </p:ext>
             </p:extLst>
           </p:nvPr>
         </p:nvGraphicFramePr>
         <p:xfrm>
-          <a:off x="758209" y="1575509"/>
-          <a:ext cx="3308985" cy="1681480"/>
+          <a:off x="1330222" y="4797753"/>
+          <a:ext cx="2570797" cy="1376680"/>
         </p:xfrm>
         <a:graphic>
           <a:graphicData uri="http://schemas.openxmlformats.org/drawingml/2006/table">
@@ -8339,14 +8339,14 @@
                 <a:tableStyleId>{5C22544A-7EE6-4342-B048-85BDC9FD1C3A}</a:tableStyleId>
               </a:tblPr>
               <a:tblGrid>
-                <a:gridCol w="1792605">
+                <a:gridCol w="1389380">
                   <a:extLst>
                     <a:ext uri="{9D8B030D-6E8A-4147-A177-3AD203B41FA5}">
                       <a16:colId xmlns:a16="http://schemas.microsoft.com/office/drawing/2014/main" val="4023821767"/>
                     </a:ext>
                   </a:extLst>
                 </a:gridCol>
-                <a:gridCol w="1516380">
+                <a:gridCol w="1181417">
                   <a:extLst>
                     <a:ext uri="{9D8B030D-6E8A-4147-A177-3AD203B41FA5}">
                       <a16:colId xmlns:a16="http://schemas.microsoft.com/office/drawing/2014/main" val="761501998"/>
@@ -8362,7 +8362,7 @@
                     <a:p>
                       <a:pPr algn="ctr"/>
                       <a:r>
-                        <a:rPr lang="en-US" sz="1600" dirty="0"/>
+                        <a:rPr lang="en-US" sz="1200" dirty="0"/>
                         <a:t>Column</a:t>
                       </a:r>
                     </a:p>
@@ -8376,7 +8376,7 @@
                     <a:p>
                       <a:pPr algn="ctr"/>
                       <a:r>
-                        <a:rPr lang="en-US" sz="1600" dirty="0"/>
+                        <a:rPr lang="en-US" sz="1200" dirty="0"/>
                         <a:t>Value</a:t>
                       </a:r>
                     </a:p>
@@ -8397,7 +8397,7 @@
                     <a:p>
                       <a:pPr algn="ctr"/>
                       <a:r>
-                        <a:rPr lang="en-IN" sz="1600" b="0" i="0" kern="1200" dirty="0" err="1">
+                        <a:rPr lang="en-IN" sz="1200" b="0" i="0" kern="1200" dirty="0" err="1">
                           <a:solidFill>
                             <a:schemeClr val="dk1"/>
                           </a:solidFill>
@@ -8409,7 +8409,7 @@
                         <a:t>brooklyn</a:t>
                       </a:r>
                       <a:r>
-                        <a:rPr lang="en-IN" sz="1600" b="0" i="0" kern="1200" dirty="0">
+                        <a:rPr lang="en-IN" sz="1200" b="0" i="0" kern="1200" dirty="0">
                           <a:solidFill>
                             <a:schemeClr val="dk1"/>
                           </a:solidFill>
@@ -8424,7 +8424,7 @@
                     <a:p>
                       <a:pPr algn="ctr"/>
                       <a:r>
-                        <a:rPr lang="en-IN" sz="1600" b="0" i="0" kern="1200" dirty="0">
+                        <a:rPr lang="en-IN" sz="1200" b="0" i="0" kern="1200" dirty="0">
                           <a:solidFill>
                             <a:schemeClr val="dk1"/>
                           </a:solidFill>
@@ -8439,7 +8439,7 @@
                     <a:p>
                       <a:pPr algn="ctr"/>
                       <a:r>
-                        <a:rPr lang="en-IN" sz="1600" b="0" i="0" kern="1200" dirty="0">
+                        <a:rPr lang="en-IN" sz="1200" b="0" i="0" kern="1200" dirty="0">
                           <a:solidFill>
                             <a:schemeClr val="dk1"/>
                           </a:solidFill>
@@ -8454,7 +8454,7 @@
                     <a:p>
                       <a:pPr algn="ctr"/>
                       <a:r>
-                        <a:rPr lang="en-IN" sz="1600" b="0" i="0" kern="1200" dirty="0">
+                        <a:rPr lang="en-IN" sz="1200" b="0" i="0" kern="1200" dirty="0">
                           <a:solidFill>
                             <a:schemeClr val="dk1"/>
                           </a:solidFill>
@@ -8469,7 +8469,7 @@
                     <a:p>
                       <a:pPr algn="ctr"/>
                       <a:r>
-                        <a:rPr lang="en-IN" sz="1600" b="0" i="0" kern="1200" dirty="0">
+                        <a:rPr lang="en-IN" sz="1200" b="0" i="0" kern="1200" dirty="0">
                           <a:solidFill>
                             <a:schemeClr val="dk1"/>
                           </a:solidFill>
@@ -8480,7 +8480,7 @@
                         </a:rPr>
                         <a:t>address</a:t>
                       </a:r>
-                      <a:endParaRPr lang="en-US" sz="1600" dirty="0"/>
+                      <a:endParaRPr lang="en-US" sz="1200" dirty="0"/>
                     </a:p>
                   </a:txBody>
                   <a:tcPr anchor="ctr"/>
@@ -8492,7 +8492,7 @@
                     <a:p>
                       <a:pPr algn="ctr"/>
                       <a:r>
-                        <a:rPr lang="en-US" sz="1600" dirty="0"/>
+                        <a:rPr lang="en-US" sz="1200" dirty="0"/>
                         <a:t>“UNKNOWN”</a:t>
                       </a:r>
                     </a:p>
@@ -8523,8 +8523,8 @@
         </p:nvSpPr>
         <p:spPr>
           <a:xfrm>
-            <a:off x="1272004" y="3262458"/>
-            <a:ext cx="2281394" cy="338554"/>
+            <a:off x="1619625" y="6169048"/>
+            <a:ext cx="2281394" cy="307777"/>
           </a:xfrm>
           <a:prstGeom prst="rect">
             <a:avLst/>
@@ -8538,7 +8538,7 @@
           <a:p>
             <a:pPr algn="ctr"/>
             <a:r>
-              <a:rPr lang="en-US" sz="1600" dirty="0"/>
+              <a:rPr lang="en-US" sz="1400" dirty="0"/>
               <a:t>Data: bss9-579f.tsv</a:t>
             </a:r>
           </a:p>
@@ -8559,14 +8559,14 @@
           <p:nvPr>
             <p:extLst>
               <p:ext uri="{D42A27DB-BD31-4B8C-83A1-F6EECF244321}">
-                <p14:modId xmlns:p14="http://schemas.microsoft.com/office/powerpoint/2010/main" val="122271229"/>
+                <p14:modId xmlns:p14="http://schemas.microsoft.com/office/powerpoint/2010/main" val="1006237924"/>
               </p:ext>
             </p:extLst>
           </p:nvPr>
         </p:nvGraphicFramePr>
         <p:xfrm>
-          <a:off x="758209" y="3759311"/>
-          <a:ext cx="2603028" cy="2031756"/>
+          <a:off x="5613421" y="4263431"/>
+          <a:ext cx="2064384" cy="1716538"/>
         </p:xfrm>
         <a:graphic>
           <a:graphicData uri="http://schemas.openxmlformats.org/drawingml/2006/table">
@@ -8575,14 +8575,14 @@
                 <a:tableStyleId>{5C22544A-7EE6-4342-B048-85BDC9FD1C3A}</a:tableStyleId>
               </a:tblPr>
               <a:tblGrid>
-                <a:gridCol w="1167130">
+                <a:gridCol w="921067">
                   <a:extLst>
                     <a:ext uri="{9D8B030D-6E8A-4147-A177-3AD203B41FA5}">
                       <a16:colId xmlns:a16="http://schemas.microsoft.com/office/drawing/2014/main" val="2065281545"/>
                     </a:ext>
                   </a:extLst>
                 </a:gridCol>
-                <a:gridCol w="1435898">
+                <a:gridCol w="1143317">
                   <a:extLst>
                     <a:ext uri="{9D8B030D-6E8A-4147-A177-3AD203B41FA5}">
                       <a16:colId xmlns:a16="http://schemas.microsoft.com/office/drawing/2014/main" val="1981118575"/>
@@ -8598,7 +8598,7 @@
                     <a:p>
                       <a:pPr algn="ctr"/>
                       <a:r>
-                        <a:rPr lang="en-US" sz="1600" dirty="0"/>
+                        <a:rPr lang="en-US" sz="1200" dirty="0"/>
                         <a:t>Summary</a:t>
                       </a:r>
                     </a:p>
@@ -8612,7 +8612,7 @@
                     <a:p>
                       <a:pPr algn="ctr"/>
                       <a:r>
-                        <a:rPr lang="en-US" sz="1600" dirty="0"/>
+                        <a:rPr lang="en-US" sz="1200" dirty="0"/>
                         <a:t>num_level_3</a:t>
                       </a:r>
                     </a:p>
@@ -8625,7 +8625,7 @@
                   </a:ext>
                 </a:extLst>
               </a:tr>
-              <a:tr h="338626">
+              <a:tr h="280632">
                 <a:tc>
                   <a:txBody>
                     <a:bodyPr/>
@@ -8633,7 +8633,7 @@
                     <a:p>
                       <a:pPr algn="ctr"/>
                       <a:r>
-                        <a:rPr lang="en-US" sz="1600" dirty="0"/>
+                        <a:rPr lang="en-US" sz="1200" dirty="0"/>
                         <a:t>count</a:t>
                       </a:r>
                     </a:p>
@@ -8647,7 +8647,7 @@
                     <a:p>
                       <a:pPr algn="ctr"/>
                       <a:r>
-                        <a:rPr lang="en-US" sz="1600" dirty="0"/>
+                        <a:rPr lang="en-US" sz="1200" dirty="0"/>
                         <a:t>5302</a:t>
                       </a:r>
                     </a:p>
@@ -8660,7 +8660,7 @@
                   </a:ext>
                 </a:extLst>
               </a:tr>
-              <a:tr h="338626">
+              <a:tr h="263769">
                 <a:tc>
                   <a:txBody>
                     <a:bodyPr/>
@@ -8668,7 +8668,7 @@
                     <a:p>
                       <a:pPr algn="ctr"/>
                       <a:r>
-                        <a:rPr lang="en-US" sz="1600" dirty="0"/>
+                        <a:rPr lang="en-US" sz="1200" dirty="0"/>
                         <a:t>mean</a:t>
                       </a:r>
                     </a:p>
@@ -8682,7 +8682,7 @@
                     <a:p>
                       <a:pPr algn="ctr"/>
                       <a:r>
-                        <a:rPr lang="en-US" sz="1600" dirty="0"/>
+                        <a:rPr lang="en-US" sz="1200" dirty="0"/>
                         <a:t>239.776</a:t>
                       </a:r>
                     </a:p>
@@ -8695,7 +8695,7 @@
                   </a:ext>
                 </a:extLst>
               </a:tr>
-              <a:tr h="338626">
+              <a:tr h="270803">
                 <a:tc>
                   <a:txBody>
                     <a:bodyPr/>
@@ -8703,10 +8703,10 @@
                     <a:p>
                       <a:pPr algn="ctr"/>
                       <a:r>
-                        <a:rPr lang="en-US" sz="1600" dirty="0" err="1"/>
+                        <a:rPr lang="en-US" sz="1200" dirty="0" err="1"/>
                         <a:t>stddev</a:t>
                       </a:r>
-                      <a:endParaRPr lang="en-US" sz="1600" dirty="0"/>
+                      <a:endParaRPr lang="en-US" sz="1200" dirty="0"/>
                     </a:p>
                   </a:txBody>
                   <a:tcPr/>
@@ -8718,7 +8718,7 @@
                     <a:p>
                       <a:pPr algn="ctr"/>
                       <a:r>
-                        <a:rPr lang="en-US" sz="1600" dirty="0"/>
+                        <a:rPr lang="en-US" sz="1200" dirty="0"/>
                         <a:t>267.144</a:t>
                       </a:r>
                     </a:p>
@@ -8731,7 +8731,7 @@
                   </a:ext>
                 </a:extLst>
               </a:tr>
-              <a:tr h="338626">
+              <a:tr h="242668">
                 <a:tc>
                   <a:txBody>
                     <a:bodyPr/>
@@ -8739,7 +8739,7 @@
                     <a:p>
                       <a:pPr algn="ctr"/>
                       <a:r>
-                        <a:rPr lang="en-US" sz="1600" dirty="0"/>
+                        <a:rPr lang="en-US" sz="1200" dirty="0"/>
                         <a:t>min</a:t>
                       </a:r>
                     </a:p>
@@ -8753,7 +8753,7 @@
                     <a:p>
                       <a:pPr algn="ctr"/>
                       <a:r>
-                        <a:rPr lang="en-US" sz="1600" dirty="0"/>
+                        <a:rPr lang="en-US" sz="1200" dirty="0"/>
                         <a:t>0.0</a:t>
                       </a:r>
                     </a:p>
@@ -8766,7 +8766,7 @@
                   </a:ext>
                 </a:extLst>
               </a:tr>
-              <a:tr h="338626">
+              <a:tr h="267286">
                 <a:tc>
                   <a:txBody>
                     <a:bodyPr/>
@@ -8774,7 +8774,7 @@
                     <a:p>
                       <a:pPr algn="ctr"/>
                       <a:r>
-                        <a:rPr lang="en-US" sz="1600" dirty="0"/>
+                        <a:rPr lang="en-US" sz="1200" dirty="0"/>
                         <a:t>max</a:t>
                       </a:r>
                     </a:p>
@@ -8788,7 +8788,7 @@
                     <a:p>
                       <a:pPr algn="ctr"/>
                       <a:r>
-                        <a:rPr lang="en-US" sz="1600" dirty="0"/>
+                        <a:rPr lang="en-US" sz="1200" dirty="0"/>
                         <a:t>2020.0</a:t>
                       </a:r>
                     </a:p>
@@ -8820,14 +8820,14 @@
           <p:nvPr>
             <p:extLst>
               <p:ext uri="{D42A27DB-BD31-4B8C-83A1-F6EECF244321}">
-                <p14:modId xmlns:p14="http://schemas.microsoft.com/office/powerpoint/2010/main" val="1368047710"/>
+                <p14:modId xmlns:p14="http://schemas.microsoft.com/office/powerpoint/2010/main" val="749722602"/>
               </p:ext>
             </p:extLst>
           </p:nvPr>
         </p:nvGraphicFramePr>
         <p:xfrm>
-          <a:off x="3474901" y="3754549"/>
-          <a:ext cx="2154873" cy="2031756"/>
+          <a:off x="7755613" y="4266948"/>
+          <a:ext cx="1705610" cy="1713021"/>
         </p:xfrm>
         <a:graphic>
           <a:graphicData uri="http://schemas.openxmlformats.org/drawingml/2006/table">
@@ -8836,14 +8836,14 @@
                 <a:tableStyleId>{5C22544A-7EE6-4342-B048-85BDC9FD1C3A}</a:tableStyleId>
               </a:tblPr>
               <a:tblGrid>
-                <a:gridCol w="689293">
+                <a:gridCol w="562293">
                   <a:extLst>
                     <a:ext uri="{9D8B030D-6E8A-4147-A177-3AD203B41FA5}">
                       <a16:colId xmlns:a16="http://schemas.microsoft.com/office/drawing/2014/main" val="2065281545"/>
                     </a:ext>
                   </a:extLst>
                 </a:gridCol>
-                <a:gridCol w="1465580">
+                <a:gridCol w="1143317">
                   <a:extLst>
                     <a:ext uri="{9D8B030D-6E8A-4147-A177-3AD203B41FA5}">
                       <a16:colId xmlns:a16="http://schemas.microsoft.com/office/drawing/2014/main" val="1981118575"/>
@@ -8859,7 +8859,7 @@
                     <a:p>
                       <a:pPr algn="ctr"/>
                       <a:r>
-                        <a:rPr lang="en-US" sz="1600" dirty="0"/>
+                        <a:rPr lang="en-US" sz="1200" dirty="0"/>
                         <a:t>rid</a:t>
                       </a:r>
                     </a:p>
@@ -8873,7 +8873,7 @@
                     <a:p>
                       <a:pPr algn="ctr"/>
                       <a:r>
-                        <a:rPr lang="en-US" sz="1600" dirty="0"/>
+                        <a:rPr lang="en-US" sz="1200" dirty="0"/>
                         <a:t>num_level_3</a:t>
                       </a:r>
                     </a:p>
@@ -8886,7 +8886,7 @@
                   </a:ext>
                 </a:extLst>
               </a:tr>
-              <a:tr h="338626">
+              <a:tr h="227878">
                 <a:tc>
                   <a:txBody>
                     <a:bodyPr/>
@@ -8894,7 +8894,7 @@
                     <a:p>
                       <a:pPr algn="ctr"/>
                       <a:r>
-                        <a:rPr lang="en-US" sz="1600" dirty="0"/>
+                        <a:rPr lang="en-US" sz="1200" dirty="0"/>
                         <a:t>847</a:t>
                       </a:r>
                     </a:p>
@@ -8908,7 +8908,7 @@
                     <a:p>
                       <a:pPr algn="ctr"/>
                       <a:r>
-                        <a:rPr lang="en-US" sz="1600" dirty="0"/>
+                        <a:rPr lang="en-US" sz="1200" dirty="0"/>
                         <a:t>1386.0</a:t>
                       </a:r>
                     </a:p>
@@ -8921,7 +8921,7 @@
                   </a:ext>
                 </a:extLst>
               </a:tr>
-              <a:tr h="338626">
+              <a:tr h="243705">
                 <a:tc>
                   <a:txBody>
                     <a:bodyPr/>
@@ -8929,7 +8929,7 @@
                     <a:p>
                       <a:pPr algn="ctr"/>
                       <a:r>
-                        <a:rPr lang="en-US" sz="1600" dirty="0"/>
+                        <a:rPr lang="en-US" sz="1200" dirty="0"/>
                         <a:t>851</a:t>
                       </a:r>
                     </a:p>
@@ -8943,7 +8943,7 @@
                     <a:p>
                       <a:pPr algn="ctr"/>
                       <a:r>
-                        <a:rPr lang="en-US" sz="1600" dirty="0"/>
+                        <a:rPr lang="en-US" sz="1200" dirty="0"/>
                         <a:t>1434.0</a:t>
                       </a:r>
                     </a:p>
@@ -8956,7 +8956,7 @@
                   </a:ext>
                 </a:extLst>
               </a:tr>
-              <a:tr h="338626">
+              <a:tr h="277115">
                 <a:tc>
                   <a:txBody>
                     <a:bodyPr/>
@@ -8964,7 +8964,7 @@
                     <a:p>
                       <a:pPr algn="ctr"/>
                       <a:r>
-                        <a:rPr lang="en-US" sz="1600" dirty="0"/>
+                        <a:rPr lang="en-US" sz="1200" dirty="0"/>
                         <a:t>963</a:t>
                       </a:r>
                     </a:p>
@@ -8978,7 +8978,7 @@
                     <a:p>
                       <a:pPr algn="ctr"/>
                       <a:r>
-                        <a:rPr lang="en-US" sz="1600" dirty="0"/>
+                        <a:rPr lang="en-US" sz="1200" dirty="0"/>
                         <a:t>1337.0</a:t>
                       </a:r>
                     </a:p>
@@ -8991,7 +8991,7 @@
                   </a:ext>
                 </a:extLst>
               </a:tr>
-              <a:tr h="338626">
+              <a:tr h="254977">
                 <a:tc>
                   <a:txBody>
                     <a:bodyPr/>
@@ -8999,7 +8999,7 @@
                     <a:p>
                       <a:pPr algn="ctr"/>
                       <a:r>
-                        <a:rPr lang="en-US" sz="1600" dirty="0"/>
+                        <a:rPr lang="en-US" sz="1200" dirty="0"/>
                         <a:t>990</a:t>
                       </a:r>
                     </a:p>
@@ -9013,7 +9013,7 @@
                     <a:p>
                       <a:pPr algn="ctr"/>
                       <a:r>
-                        <a:rPr lang="en-US" sz="1600" dirty="0"/>
+                        <a:rPr lang="en-US" sz="1200" dirty="0"/>
                         <a:t>1344.0</a:t>
                       </a:r>
                     </a:p>
@@ -9026,7 +9026,7 @@
                   </a:ext>
                 </a:extLst>
               </a:tr>
-              <a:tr h="338626">
+              <a:tr h="244426">
                 <a:tc>
                   <a:txBody>
                     <a:bodyPr/>
@@ -9034,7 +9034,7 @@
                     <a:p>
                       <a:pPr algn="ctr"/>
                       <a:r>
-                        <a:rPr lang="en-US" sz="1600" dirty="0"/>
+                        <a:rPr lang="en-US" sz="1200" dirty="0"/>
                         <a:t>1493</a:t>
                       </a:r>
                     </a:p>
@@ -9048,7 +9048,7 @@
                     <a:p>
                       <a:pPr algn="ctr"/>
                       <a:r>
-                        <a:rPr lang="en-US" sz="1600" dirty="0"/>
+                        <a:rPr lang="en-US" sz="1200" dirty="0"/>
                         <a:t>1522.0</a:t>
                       </a:r>
                     </a:p>
@@ -9079,8 +9079,8 @@
         </p:nvSpPr>
         <p:spPr>
           <a:xfrm>
-            <a:off x="1938518" y="5772753"/>
-            <a:ext cx="2516023" cy="338554"/>
+            <a:off x="6376691" y="5969931"/>
+            <a:ext cx="2516023" cy="307777"/>
           </a:xfrm>
           <a:prstGeom prst="rect">
             <a:avLst/>
@@ -9094,92 +9094,72 @@
           <a:p>
             <a:pPr algn="ctr"/>
             <a:r>
-              <a:rPr lang="en-US" sz="1600" dirty="0"/>
+              <a:rPr lang="en-US" sz="1400" dirty="0"/>
               <a:t>Data: usap-qc7e.tsv</a:t>
             </a:r>
           </a:p>
         </p:txBody>
       </p:sp>
-      <p:sp>
-        <p:nvSpPr>
-          <p:cNvPr id="11" name="Rectangle 10">
+      <p:pic>
+        <p:nvPicPr>
+          <p:cNvPr id="4" name="Picture 3">
             <a:extLst>
               <a:ext uri="{FF2B5EF4-FFF2-40B4-BE49-F238E27FC236}">
-                <a16:creationId xmlns:a16="http://schemas.microsoft.com/office/drawing/2014/main" id="{C4ACFFD7-DAD1-4C9D-9621-E9C2B5455D11}"/>
+                <a16:creationId xmlns:a16="http://schemas.microsoft.com/office/drawing/2014/main" id="{A462765B-F7FF-48F1-8746-6A37B6F7E8EE}"/>
               </a:ext>
             </a:extLst>
           </p:cNvPr>
-          <p:cNvSpPr/>
+          <p:cNvPicPr>
+            <a:picLocks noChangeAspect="1"/>
+          </p:cNvPicPr>
           <p:nvPr/>
-        </p:nvSpPr>
+        </p:nvPicPr>
+        <p:blipFill>
+          <a:blip r:embed="rId2"/>
+          <a:stretch>
+            <a:fillRect/>
+          </a:stretch>
+        </p:blipFill>
         <p:spPr>
           <a:xfrm>
-            <a:off x="4271035" y="1575509"/>
-            <a:ext cx="2248637" cy="1077218"/>
+            <a:off x="646111" y="1329273"/>
+            <a:ext cx="4426634" cy="3319976"/>
           </a:xfrm>
           <a:prstGeom prst="rect">
             <a:avLst/>
           </a:prstGeom>
         </p:spPr>
-        <p:txBody>
-          <a:bodyPr wrap="square">
-            <a:spAutoFit/>
-          </a:bodyPr>
-          <a:lstStyle/>
-          <a:p>
-            <a:pPr algn="ctr"/>
-            <a:r>
-              <a:rPr lang="en-US" sz="1600" dirty="0">
-                <a:hlinkClick r:id="rId2" action="ppaction://hlinkfile"/>
-              </a:rPr>
-              <a:t>DBSCAN results</a:t>
-            </a:r>
-            <a:endParaRPr lang="en-US" sz="1600" dirty="0"/>
-          </a:p>
-          <a:p>
-            <a:pPr algn="ctr"/>
-            <a:r>
-              <a:rPr lang="en-US" sz="1600" dirty="0"/>
-              <a:t>(</a:t>
-            </a:r>
-            <a:r>
-              <a:rPr lang="en-US" sz="1600" dirty="0" err="1"/>
-              <a:t>pickup_latitude</a:t>
-            </a:r>
-            <a:r>
-              <a:rPr lang="en-US" sz="1600" dirty="0"/>
-              <a:t>,</a:t>
-            </a:r>
-          </a:p>
-          <a:p>
-            <a:pPr algn="ctr"/>
-            <a:r>
-              <a:rPr lang="en-US" sz="1600" dirty="0"/>
-              <a:t>    </a:t>
-            </a:r>
-            <a:r>
-              <a:rPr lang="en-US" sz="1600" dirty="0" err="1"/>
-              <a:t>pickup_longitude</a:t>
-            </a:r>
-            <a:r>
-              <a:rPr lang="en-US" sz="1600" dirty="0"/>
-              <a:t>)</a:t>
-            </a:r>
-          </a:p>
-          <a:p>
-            <a:pPr algn="ctr"/>
-            <a:r>
-              <a:rPr lang="en-US" sz="1600" dirty="0"/>
-              <a:t>Data: </a:t>
-            </a:r>
-            <a:r>
-              <a:rPr lang="en-US" sz="1600" dirty="0" err="1"/>
-              <a:t>ghpb-fpea.tsv</a:t>
-            </a:r>
-            <a:endParaRPr lang="en-US" sz="1600" dirty="0"/>
-          </a:p>
-        </p:txBody>
-      </p:sp>
+      </p:pic>
+      <p:pic>
+        <p:nvPicPr>
+          <p:cNvPr id="12" name="Picture 11">
+            <a:extLst>
+              <a:ext uri="{FF2B5EF4-FFF2-40B4-BE49-F238E27FC236}">
+                <a16:creationId xmlns:a16="http://schemas.microsoft.com/office/drawing/2014/main" id="{0435B9CF-C03D-4D7B-B7CB-44C072C02B09}"/>
+              </a:ext>
+            </a:extLst>
+          </p:cNvPr>
+          <p:cNvPicPr>
+            <a:picLocks noChangeAspect="1"/>
+          </p:cNvPicPr>
+          <p:nvPr/>
+        </p:nvPicPr>
+        <p:blipFill>
+          <a:blip r:embed="rId3"/>
+          <a:stretch>
+            <a:fillRect/>
+          </a:stretch>
+        </p:blipFill>
+        <p:spPr>
+          <a:xfrm>
+            <a:off x="5304310" y="1329273"/>
+            <a:ext cx="4127988" cy="2751992"/>
+          </a:xfrm>
+          <a:prstGeom prst="rect">
+            <a:avLst/>
+          </a:prstGeom>
+        </p:spPr>
+      </p:pic>
     </p:spTree>
     <p:extLst>
       <p:ext uri="{BB962C8B-B14F-4D97-AF65-F5344CB8AC3E}">

</xml_diff>